<commit_message>
deleted test files, and changed documents
</commit_message>
<xml_diff>
--- a/documents/verslag/BioCodeGaming.pptx
+++ b/documents/verslag/BioCodeGaming.pptx
@@ -5,11 +5,14 @@
     <p:sldMasterId id="2147483648" r:id="rId1"/>
   </p:sldMasterIdLst>
   <p:notesMasterIdLst>
-    <p:notesMasterId r:id="rId4"/>
+    <p:notesMasterId r:id="rId7"/>
   </p:notesMasterIdLst>
   <p:sldIdLst>
     <p:sldId id="256" r:id="rId2"/>
     <p:sldId id="257" r:id="rId3"/>
+    <p:sldId id="258" r:id="rId4"/>
+    <p:sldId id="259" r:id="rId5"/>
+    <p:sldId id="260" r:id="rId6"/>
   </p:sldIdLst>
   <p:sldSz cx="12192000" cy="6858000"/>
   <p:notesSz cx="6858000" cy="9144000"/>
@@ -108,6 +111,11 @@
       </a:defRPr>
     </a:lvl9pPr>
   </p:defaultTextStyle>
+  <p:extLst>
+    <p:ext uri="{EFAFB233-063F-42B5-8137-9DF3F51BA10A}">
+      <p15:sldGuideLst xmlns:p15="http://schemas.microsoft.com/office/powerpoint/2012/main"/>
+    </p:ext>
+  </p:extLst>
 </p:presentation>
 </file>
 
@@ -193,7 +201,7 @@
           <a:p>
             <a:fld id="{305E0C21-EABC-4223-9F5A-68250C2263C5}" type="datetimeFigureOut">
               <a:rPr lang="nl-NL" smtClean="0"/>
-              <a:t>21-6-2017</a:t>
+              <a:t>26-6-2017</a:t>
             </a:fld>
             <a:endParaRPr lang="nl-NL"/>
           </a:p>
@@ -1105,9 +1113,9 @@
             </a:lvl1pPr>
           </a:lstStyle>
           <a:p>
-            <a:fld id="{9EA361CF-55E7-4AA6-88A4-DF4C7FAB5DF5}" type="datetime1">
+            <a:fld id="{2AF2B558-154D-499B-B4B3-AC0A6ABD42BF}" type="datetime1">
               <a:rPr lang="en-US" smtClean="0"/>
-              <a:t>6/21/2017</a:t>
+              <a:t>6/26/2017</a:t>
             </a:fld>
             <a:endParaRPr lang="en-US" dirty="0"/>
           </a:p>
@@ -2225,9 +2233,9 @@
           <a:bodyPr/>
           <a:lstStyle/>
           <a:p>
-            <a:fld id="{48D8532C-EA57-4D6D-9E87-435F1308D620}" type="datetime1">
+            <a:fld id="{624CB21E-347F-418B-A593-5E2994B11045}" type="datetime1">
               <a:rPr lang="en-US" smtClean="0"/>
-              <a:t>6/21/2017</a:t>
+              <a:t>6/26/2017</a:t>
             </a:fld>
             <a:endParaRPr lang="en-US" dirty="0"/>
           </a:p>
@@ -3236,9 +3244,9 @@
           <a:bodyPr/>
           <a:lstStyle/>
           <a:p>
-            <a:fld id="{53FB938A-BB8D-4EF7-8A40-6FEBE5CE134C}" type="datetime1">
+            <a:fld id="{B04FE848-C7F9-4921-94D7-375D127972BE}" type="datetime1">
               <a:rPr lang="en-US" smtClean="0"/>
-              <a:t>6/21/2017</a:t>
+              <a:t>6/26/2017</a:t>
             </a:fld>
             <a:endParaRPr lang="en-US" dirty="0"/>
           </a:p>
@@ -4406,9 +4414,9 @@
           <a:bodyPr/>
           <a:lstStyle/>
           <a:p>
-            <a:fld id="{53DA61F9-0DAC-450A-8A7D-2D87B5E5D1FF}" type="datetime1">
+            <a:fld id="{872976D0-2B15-45F6-893A-DA296CD09BD3}" type="datetime1">
               <a:rPr lang="en-US" smtClean="0"/>
-              <a:t>6/21/2017</a:t>
+              <a:t>6/26/2017</a:t>
             </a:fld>
             <a:endParaRPr lang="en-US" dirty="0"/>
           </a:p>
@@ -5467,9 +5475,9 @@
           <a:bodyPr/>
           <a:lstStyle/>
           <a:p>
-            <a:fld id="{37660E87-BCC6-4296-A734-50487F9A82CC}" type="datetime1">
+            <a:fld id="{2916DE61-E123-43CE-84E4-9CD46902966A}" type="datetime1">
               <a:rPr lang="en-US" smtClean="0"/>
-              <a:t>6/21/2017</a:t>
+              <a:t>6/26/2017</a:t>
             </a:fld>
             <a:endParaRPr lang="en-US" dirty="0"/>
           </a:p>
@@ -6113,9 +6121,9 @@
           <a:bodyPr/>
           <a:lstStyle/>
           <a:p>
-            <a:fld id="{2C067A34-4DB8-41F2-826F-43530A78A1FA}" type="datetime1">
+            <a:fld id="{F76031AC-18DC-4D0E-B1F8-F78FFA5C9C19}" type="datetime1">
               <a:rPr lang="en-US" smtClean="0"/>
-              <a:t>6/21/2017</a:t>
+              <a:t>6/26/2017</a:t>
             </a:fld>
             <a:endParaRPr lang="en-US" dirty="0"/>
           </a:p>
@@ -6960,9 +6968,9 @@
           <a:bodyPr/>
           <a:lstStyle/>
           <a:p>
-            <a:fld id="{99ED2F4E-11BE-4A5C-A5C4-3604E7D08B57}" type="datetime1">
+            <a:fld id="{1E6BE175-728E-4C33-8CCC-2DF4EF118274}" type="datetime1">
               <a:rPr lang="en-US" smtClean="0"/>
-              <a:t>6/21/2017</a:t>
+              <a:t>6/26/2017</a:t>
             </a:fld>
             <a:endParaRPr lang="en-US" dirty="0"/>
           </a:p>
@@ -7135,9 +7143,9 @@
           <a:bodyPr/>
           <a:lstStyle/>
           <a:p>
-            <a:fld id="{59CE117A-4A21-4DE2-B968-654A50415695}" type="datetime1">
+            <a:fld id="{C9DC9D80-B042-4751-B383-C5DD9B8194D8}" type="datetime1">
               <a:rPr lang="en-US" smtClean="0"/>
-              <a:t>6/21/2017</a:t>
+              <a:t>6/26/2017</a:t>
             </a:fld>
             <a:endParaRPr lang="en-US" dirty="0"/>
           </a:p>
@@ -8133,9 +8141,9 @@
           <a:bodyPr/>
           <a:lstStyle/>
           <a:p>
-            <a:fld id="{77BB27DA-CC54-416E-87D8-65184B9CBAE9}" type="datetime1">
+            <a:fld id="{85FC9EFA-A6D1-45A7-A0E7-3B1CBAAE089A}" type="datetime1">
               <a:rPr lang="en-US" smtClean="0"/>
-              <a:t>6/21/2017</a:t>
+              <a:t>6/26/2017</a:t>
             </a:fld>
             <a:endParaRPr lang="en-US" dirty="0"/>
           </a:p>
@@ -8339,9 +8347,9 @@
           <a:bodyPr/>
           <a:lstStyle/>
           <a:p>
-            <a:fld id="{F6102AA4-3D20-4075-B5B0-59706F7C1315}" type="datetime1">
+            <a:fld id="{695CEA45-5058-4145-B08F-B4C9D5AA44AC}" type="datetime1">
               <a:rPr lang="en-US" smtClean="0"/>
-              <a:t>6/21/2017</a:t>
+              <a:t>6/26/2017</a:t>
             </a:fld>
             <a:endParaRPr lang="en-US" dirty="0"/>
           </a:p>
@@ -9401,9 +9409,9 @@
           <a:bodyPr/>
           <a:lstStyle/>
           <a:p>
-            <a:fld id="{67286030-F459-4FC9-BB87-A8A7294A9EC9}" type="datetime1">
+            <a:fld id="{FF311F96-313D-4190-AD48-BEE3E9D43729}" type="datetime1">
               <a:rPr lang="en-US" smtClean="0"/>
-              <a:t>6/21/2017</a:t>
+              <a:t>6/26/2017</a:t>
             </a:fld>
             <a:endParaRPr lang="en-US" dirty="0"/>
           </a:p>
@@ -9673,9 +9681,9 @@
           <a:bodyPr/>
           <a:lstStyle/>
           <a:p>
-            <a:fld id="{43CD94B1-10FA-47A0-A558-2AC9397BFF72}" type="datetime1">
+            <a:fld id="{8154593A-3242-4DB7-87D3-652C7F97696D}" type="datetime1">
               <a:rPr lang="en-US" smtClean="0"/>
-              <a:t>6/21/2017</a:t>
+              <a:t>6/26/2017</a:t>
             </a:fld>
             <a:endParaRPr lang="en-US" dirty="0"/>
           </a:p>
@@ -10055,9 +10063,9 @@
           <a:bodyPr/>
           <a:lstStyle/>
           <a:p>
-            <a:fld id="{C3D671E7-499B-448E-BF01-27CFCCE5EF19}" type="datetime1">
+            <a:fld id="{3D2E83E2-9887-47D2-B01A-3FBA9433EC7C}" type="datetime1">
               <a:rPr lang="en-US" smtClean="0"/>
-              <a:t>6/21/2017</a:t>
+              <a:t>6/26/2017</a:t>
             </a:fld>
             <a:endParaRPr lang="en-US" dirty="0"/>
           </a:p>
@@ -10173,9 +10181,9 @@
           <a:bodyPr/>
           <a:lstStyle/>
           <a:p>
-            <a:fld id="{5CCCD706-171D-445B-93AF-5A9CC9EC5310}" type="datetime1">
+            <a:fld id="{8BFDF2C8-A594-4310-9BD9-C7BDF4671DEE}" type="datetime1">
               <a:rPr lang="en-US" smtClean="0"/>
-              <a:t>6/21/2017</a:t>
+              <a:t>6/26/2017</a:t>
             </a:fld>
             <a:endParaRPr lang="en-US" dirty="0"/>
           </a:p>
@@ -10268,9 +10276,9 @@
           <a:bodyPr/>
           <a:lstStyle/>
           <a:p>
-            <a:fld id="{B5BB6794-1E91-46EC-A603-FF02842CE66E}" type="datetime1">
+            <a:fld id="{FD4ACA6F-42F0-441C-89BF-CCA50F2FB57F}" type="datetime1">
               <a:rPr lang="en-US" smtClean="0"/>
-              <a:t>6/21/2017</a:t>
+              <a:t>6/26/2017</a:t>
             </a:fld>
             <a:endParaRPr lang="en-US" dirty="0"/>
           </a:p>
@@ -11377,9 +11385,9 @@
           <a:bodyPr/>
           <a:lstStyle/>
           <a:p>
-            <a:fld id="{1011B869-E939-4E99-847E-606451038D6A}" type="datetime1">
+            <a:fld id="{F93C3C65-4D62-4BD5-A782-F37ED81AB410}" type="datetime1">
               <a:rPr lang="en-US" smtClean="0"/>
-              <a:t>6/21/2017</a:t>
+              <a:t>6/26/2017</a:t>
             </a:fld>
             <a:endParaRPr lang="en-US" dirty="0"/>
           </a:p>
@@ -12510,9 +12518,9 @@
           <a:bodyPr/>
           <a:lstStyle/>
           <a:p>
-            <a:fld id="{0C3FD111-48FF-4BB5-860E-99BF28C3CDCE}" type="datetime1">
+            <a:fld id="{AC4B6E75-C301-4E24-A2B8-AEEBE97F24D5}" type="datetime1">
               <a:rPr lang="en-US" smtClean="0"/>
-              <a:t>6/21/2017</a:t>
+              <a:t>6/26/2017</a:t>
             </a:fld>
             <a:endParaRPr lang="en-US" dirty="0"/>
           </a:p>
@@ -13538,9 +13546,9 @@
             </a:lvl1pPr>
           </a:lstStyle>
           <a:p>
-            <a:fld id="{A9CA7A1E-86C9-4B20-9B97-E9E75DC82454}" type="datetime1">
+            <a:fld id="{2058419F-2F35-428B-BB93-D3A592E6C97D}" type="datetime1">
               <a:rPr lang="en-US" smtClean="0"/>
-              <a:t>6/21/2017</a:t>
+              <a:t>6/26/2017</a:t>
             </a:fld>
             <a:endParaRPr lang="en-US" dirty="0"/>
           </a:p>
@@ -13685,7 +13693,7 @@
     <p:sldLayoutId id="2147483658" r:id="rId16"/>
     <p:sldLayoutId id="2147483659" r:id="rId17"/>
   </p:sldLayoutIdLst>
-  <p:hf sldNum="0" hdr="0" ftr="0" dt="0"/>
+  <p:hf hdr="0" ftr="0" dt="0"/>
   <p:txStyles>
     <p:titleStyle>
       <a:lvl1pPr algn="l" defTabSz="457200" rtl="0" eaLnBrk="1" latinLnBrk="0" hangingPunct="1">
@@ -14230,6 +14238,30 @@
           </a:p>
         </p:txBody>
       </p:sp>
+      <p:sp>
+        <p:nvSpPr>
+          <p:cNvPr id="4" name="Slide Number Placeholder 3"/>
+          <p:cNvSpPr>
+            <a:spLocks noGrp="1"/>
+          </p:cNvSpPr>
+          <p:nvPr>
+            <p:ph type="sldNum" sz="quarter" idx="12"/>
+          </p:nvPr>
+        </p:nvSpPr>
+        <p:spPr/>
+        <p:txBody>
+          <a:bodyPr/>
+          <a:lstStyle/>
+          <a:p>
+            <a:fld id="{D57F1E4F-1CFF-5643-939E-217C01CDF565}" type="slidenum">
+              <a:rPr lang="en-US" smtClean="0"/>
+              <a:pPr/>
+              <a:t>1</a:t>
+            </a:fld>
+            <a:endParaRPr lang="en-US" dirty="0"/>
+          </a:p>
+        </p:txBody>
+      </p:sp>
     </p:spTree>
     <p:extLst>
       <p:ext uri="{BB962C8B-B14F-4D97-AF65-F5344CB8AC3E}">
@@ -14303,7 +14335,10 @@
           <a:bodyPr/>
           <a:lstStyle/>
           <a:p>
-            <a:endParaRPr lang="nl-NL" dirty="0"/>
+            <a:r>
+              <a:rPr lang="nl-NL" dirty="0"/>
+              <a:t>inleiding</a:t>
+            </a:r>
           </a:p>
         </p:txBody>
       </p:sp>
@@ -14322,7 +14357,73 @@
           <a:bodyPr/>
           <a:lstStyle/>
           <a:p>
-            <a:endParaRPr lang="nl-NL"/>
+            <a:pPr marL="457200" lvl="1" indent="0">
+              <a:buNone/>
+            </a:pPr>
+            <a:r>
+              <a:rPr lang="nl-NL" dirty="0"/>
+              <a:t>1. Waarom hebben we hiervoor gekozen?</a:t>
+            </a:r>
+          </a:p>
+          <a:p>
+            <a:pPr marL="457200" lvl="1" indent="0">
+              <a:buNone/>
+            </a:pPr>
+            <a:r>
+              <a:rPr lang="nl-NL" dirty="0"/>
+              <a:t>2. Taken verdeling</a:t>
+            </a:r>
+          </a:p>
+          <a:p>
+            <a:pPr marL="457200" lvl="1" indent="0">
+              <a:buNone/>
+            </a:pPr>
+            <a:r>
+              <a:rPr lang="nl-NL" dirty="0"/>
+              <a:t>3. Voorbereidingen</a:t>
+            </a:r>
+          </a:p>
+          <a:p>
+            <a:pPr marL="457200" lvl="1" indent="0">
+              <a:buNone/>
+            </a:pPr>
+            <a:r>
+              <a:rPr lang="nl-NL" dirty="0"/>
+              <a:t>4. Tijdens het project</a:t>
+            </a:r>
+          </a:p>
+          <a:p>
+            <a:pPr marL="457200" lvl="1" indent="0">
+              <a:buNone/>
+            </a:pPr>
+            <a:r>
+              <a:rPr lang="nl-NL" dirty="0"/>
+              <a:t>5. </a:t>
+            </a:r>
+          </a:p>
+        </p:txBody>
+      </p:sp>
+      <p:sp>
+        <p:nvSpPr>
+          <p:cNvPr id="4" name="Slide Number Placeholder 3"/>
+          <p:cNvSpPr>
+            <a:spLocks noGrp="1"/>
+          </p:cNvSpPr>
+          <p:nvPr>
+            <p:ph type="sldNum" sz="quarter" idx="12"/>
+          </p:nvPr>
+        </p:nvSpPr>
+        <p:spPr/>
+        <p:txBody>
+          <a:bodyPr/>
+          <a:lstStyle/>
+          <a:p>
+            <a:fld id="{D57F1E4F-1CFF-5643-939E-217C01CDF565}" type="slidenum">
+              <a:rPr lang="en-US" smtClean="0"/>
+              <a:pPr/>
+              <a:t>2</a:t>
+            </a:fld>
+            <a:endParaRPr lang="en-US" dirty="0"/>
           </a:p>
         </p:txBody>
       </p:sp>
@@ -14330,6 +14431,297 @@
     <p:extLst>
       <p:ext uri="{BB962C8B-B14F-4D97-AF65-F5344CB8AC3E}">
         <p14:creationId xmlns:p14="http://schemas.microsoft.com/office/powerpoint/2010/main" val="246183099"/>
+      </p:ext>
+    </p:extLst>
+  </p:cSld>
+  <p:clrMapOvr>
+    <a:masterClrMapping/>
+  </p:clrMapOvr>
+</p:sld>
+</file>
+
+<file path=ppt/slides/slide3.xml><?xml version="1.0" encoding="utf-8"?>
+<p:sld xmlns:a="http://schemas.openxmlformats.org/drawingml/2006/main" xmlns:r="http://schemas.openxmlformats.org/officeDocument/2006/relationships" xmlns:p="http://schemas.openxmlformats.org/presentationml/2006/main">
+  <p:cSld>
+    <p:spTree>
+      <p:nvGrpSpPr>
+        <p:cNvPr id="1" name=""/>
+        <p:cNvGrpSpPr/>
+        <p:nvPr/>
+      </p:nvGrpSpPr>
+      <p:grpSpPr>
+        <a:xfrm>
+          <a:off x="0" y="0"/>
+          <a:ext cx="0" cy="0"/>
+          <a:chOff x="0" y="0"/>
+          <a:chExt cx="0" cy="0"/>
+        </a:xfrm>
+      </p:grpSpPr>
+      <p:sp>
+        <p:nvSpPr>
+          <p:cNvPr id="2" name="Title 1"/>
+          <p:cNvSpPr>
+            <a:spLocks noGrp="1"/>
+          </p:cNvSpPr>
+          <p:nvPr>
+            <p:ph type="title"/>
+          </p:nvPr>
+        </p:nvSpPr>
+        <p:spPr/>
+        <p:txBody>
+          <a:bodyPr/>
+          <a:lstStyle/>
+          <a:p>
+            <a:r>
+              <a:rPr lang="nl-NL" dirty="0"/>
+              <a:t>Waarom hebben we hiervoor gekozen?</a:t>
+            </a:r>
+            <a:br>
+              <a:rPr lang="nl-NL" dirty="0"/>
+            </a:br>
+            <a:endParaRPr lang="nl-NL" dirty="0"/>
+          </a:p>
+        </p:txBody>
+      </p:sp>
+      <p:sp>
+        <p:nvSpPr>
+          <p:cNvPr id="3" name="Content Placeholder 2"/>
+          <p:cNvSpPr>
+            <a:spLocks noGrp="1"/>
+          </p:cNvSpPr>
+          <p:nvPr>
+            <p:ph idx="1"/>
+          </p:nvPr>
+        </p:nvSpPr>
+        <p:spPr/>
+        <p:txBody>
+          <a:bodyPr/>
+          <a:lstStyle/>
+          <a:p>
+            <a:endParaRPr lang="nl-NL"/>
+          </a:p>
+        </p:txBody>
+      </p:sp>
+      <p:sp>
+        <p:nvSpPr>
+          <p:cNvPr id="4" name="Slide Number Placeholder 3"/>
+          <p:cNvSpPr>
+            <a:spLocks noGrp="1"/>
+          </p:cNvSpPr>
+          <p:nvPr>
+            <p:ph type="sldNum" sz="quarter" idx="12"/>
+          </p:nvPr>
+        </p:nvSpPr>
+        <p:spPr/>
+        <p:txBody>
+          <a:bodyPr/>
+          <a:lstStyle/>
+          <a:p>
+            <a:fld id="{D57F1E4F-1CFF-5643-939E-217C01CDF565}" type="slidenum">
+              <a:rPr lang="en-US" smtClean="0"/>
+              <a:pPr/>
+              <a:t>3</a:t>
+            </a:fld>
+            <a:endParaRPr lang="en-US" dirty="0"/>
+          </a:p>
+        </p:txBody>
+      </p:sp>
+    </p:spTree>
+    <p:extLst>
+      <p:ext uri="{BB962C8B-B14F-4D97-AF65-F5344CB8AC3E}">
+        <p14:creationId xmlns:p14="http://schemas.microsoft.com/office/powerpoint/2010/main" val="634391359"/>
+      </p:ext>
+    </p:extLst>
+  </p:cSld>
+  <p:clrMapOvr>
+    <a:masterClrMapping/>
+  </p:clrMapOvr>
+</p:sld>
+</file>
+
+<file path=ppt/slides/slide4.xml><?xml version="1.0" encoding="utf-8"?>
+<p:sld xmlns:a="http://schemas.openxmlformats.org/drawingml/2006/main" xmlns:r="http://schemas.openxmlformats.org/officeDocument/2006/relationships" xmlns:p="http://schemas.openxmlformats.org/presentationml/2006/main">
+  <p:cSld>
+    <p:spTree>
+      <p:nvGrpSpPr>
+        <p:cNvPr id="1" name=""/>
+        <p:cNvGrpSpPr/>
+        <p:nvPr/>
+      </p:nvGrpSpPr>
+      <p:grpSpPr>
+        <a:xfrm>
+          <a:off x="0" y="0"/>
+          <a:ext cx="0" cy="0"/>
+          <a:chOff x="0" y="0"/>
+          <a:chExt cx="0" cy="0"/>
+        </a:xfrm>
+      </p:grpSpPr>
+      <p:sp>
+        <p:nvSpPr>
+          <p:cNvPr id="2" name="Title 1"/>
+          <p:cNvSpPr>
+            <a:spLocks noGrp="1"/>
+          </p:cNvSpPr>
+          <p:nvPr>
+            <p:ph type="title"/>
+          </p:nvPr>
+        </p:nvSpPr>
+        <p:spPr/>
+        <p:txBody>
+          <a:bodyPr/>
+          <a:lstStyle/>
+          <a:p>
+            <a:r>
+              <a:rPr lang="nl-NL" dirty="0"/>
+              <a:t>Taken verdeling</a:t>
+            </a:r>
+            <a:endParaRPr lang="nl-NL" dirty="0"/>
+          </a:p>
+        </p:txBody>
+      </p:sp>
+      <p:sp>
+        <p:nvSpPr>
+          <p:cNvPr id="3" name="Content Placeholder 2"/>
+          <p:cNvSpPr>
+            <a:spLocks noGrp="1"/>
+          </p:cNvSpPr>
+          <p:nvPr>
+            <p:ph idx="1"/>
+          </p:nvPr>
+        </p:nvSpPr>
+        <p:spPr/>
+        <p:txBody>
+          <a:bodyPr/>
+          <a:lstStyle/>
+          <a:p>
+            <a:endParaRPr lang="nl-NL"/>
+          </a:p>
+        </p:txBody>
+      </p:sp>
+      <p:sp>
+        <p:nvSpPr>
+          <p:cNvPr id="4" name="Slide Number Placeholder 3"/>
+          <p:cNvSpPr>
+            <a:spLocks noGrp="1"/>
+          </p:cNvSpPr>
+          <p:nvPr>
+            <p:ph type="sldNum" sz="quarter" idx="12"/>
+          </p:nvPr>
+        </p:nvSpPr>
+        <p:spPr/>
+        <p:txBody>
+          <a:bodyPr/>
+          <a:lstStyle/>
+          <a:p>
+            <a:fld id="{D57F1E4F-1CFF-5643-939E-217C01CDF565}" type="slidenum">
+              <a:rPr lang="en-US" smtClean="0"/>
+              <a:pPr/>
+              <a:t>4</a:t>
+            </a:fld>
+            <a:endParaRPr lang="en-US" dirty="0"/>
+          </a:p>
+        </p:txBody>
+      </p:sp>
+    </p:spTree>
+    <p:extLst>
+      <p:ext uri="{BB962C8B-B14F-4D97-AF65-F5344CB8AC3E}">
+        <p14:creationId xmlns:p14="http://schemas.microsoft.com/office/powerpoint/2010/main" val="3838281785"/>
+      </p:ext>
+    </p:extLst>
+  </p:cSld>
+  <p:clrMapOvr>
+    <a:masterClrMapping/>
+  </p:clrMapOvr>
+</p:sld>
+</file>
+
+<file path=ppt/slides/slide5.xml><?xml version="1.0" encoding="utf-8"?>
+<p:sld xmlns:a="http://schemas.openxmlformats.org/drawingml/2006/main" xmlns:r="http://schemas.openxmlformats.org/officeDocument/2006/relationships" xmlns:p="http://schemas.openxmlformats.org/presentationml/2006/main">
+  <p:cSld>
+    <p:spTree>
+      <p:nvGrpSpPr>
+        <p:cNvPr id="1" name=""/>
+        <p:cNvGrpSpPr/>
+        <p:nvPr/>
+      </p:nvGrpSpPr>
+      <p:grpSpPr>
+        <a:xfrm>
+          <a:off x="0" y="0"/>
+          <a:ext cx="0" cy="0"/>
+          <a:chOff x="0" y="0"/>
+          <a:chExt cx="0" cy="0"/>
+        </a:xfrm>
+      </p:grpSpPr>
+      <p:sp>
+        <p:nvSpPr>
+          <p:cNvPr id="2" name="Title 1"/>
+          <p:cNvSpPr>
+            <a:spLocks noGrp="1"/>
+          </p:cNvSpPr>
+          <p:nvPr>
+            <p:ph type="title"/>
+          </p:nvPr>
+        </p:nvSpPr>
+        <p:spPr/>
+        <p:txBody>
+          <a:bodyPr/>
+          <a:lstStyle/>
+          <a:p>
+            <a:r>
+              <a:rPr lang="nl-NL" dirty="0"/>
+              <a:t>Voorbereidingen</a:t>
+            </a:r>
+            <a:endParaRPr lang="nl-NL" dirty="0"/>
+          </a:p>
+        </p:txBody>
+      </p:sp>
+      <p:sp>
+        <p:nvSpPr>
+          <p:cNvPr id="3" name="Content Placeholder 2"/>
+          <p:cNvSpPr>
+            <a:spLocks noGrp="1"/>
+          </p:cNvSpPr>
+          <p:nvPr>
+            <p:ph idx="1"/>
+          </p:nvPr>
+        </p:nvSpPr>
+        <p:spPr/>
+        <p:txBody>
+          <a:bodyPr/>
+          <a:lstStyle/>
+          <a:p>
+            <a:endParaRPr lang="nl-NL"/>
+          </a:p>
+        </p:txBody>
+      </p:sp>
+      <p:sp>
+        <p:nvSpPr>
+          <p:cNvPr id="4" name="Slide Number Placeholder 3"/>
+          <p:cNvSpPr>
+            <a:spLocks noGrp="1"/>
+          </p:cNvSpPr>
+          <p:nvPr>
+            <p:ph type="sldNum" sz="quarter" idx="12"/>
+          </p:nvPr>
+        </p:nvSpPr>
+        <p:spPr/>
+        <p:txBody>
+          <a:bodyPr/>
+          <a:lstStyle/>
+          <a:p>
+            <a:fld id="{D57F1E4F-1CFF-5643-939E-217C01CDF565}" type="slidenum">
+              <a:rPr lang="en-US" smtClean="0"/>
+              <a:pPr/>
+              <a:t>5</a:t>
+            </a:fld>
+            <a:endParaRPr lang="en-US" dirty="0"/>
+          </a:p>
+        </p:txBody>
+      </p:sp>
+    </p:spTree>
+    <p:extLst>
+      <p:ext uri="{BB962C8B-B14F-4D97-AF65-F5344CB8AC3E}">
+        <p14:creationId xmlns:p14="http://schemas.microsoft.com/office/powerpoint/2010/main" val="1322402508"/>
       </p:ext>
     </p:extLst>
   </p:cSld>

</xml_diff>